<commit_message>
Updated presentation - RL
</commit_message>
<xml_diff>
--- a/presentation.pptx
+++ b/presentation.pptx
@@ -8708,6 +8708,15 @@
 </file>
 
 <file path=customXml/item2.xml><?xml version="1.0" encoding="utf-8"?>
+<p:properties xmlns:p="http://schemas.microsoft.com/office/2006/metadata/properties" xmlns:xsi="http://www.w3.org/2001/XMLSchema-instance" xmlns:pc="http://schemas.microsoft.com/office/infopath/2007/PartnerControls">
+  <documentManagement>
+    <Status xmlns="71af3243-3dd4-4a8d-8c0d-dd76da1f02a5">Not started</Status>
+    <MediaServiceKeyPoints xmlns="71af3243-3dd4-4a8d-8c0d-dd76da1f02a5" xsi:nil="true"/>
+  </documentManagement>
+</p:properties>
+</file>
+
+<file path=customXml/item3.xml><?xml version="1.0" encoding="utf-8"?>
 <ct:contentTypeSchema xmlns:ct="http://schemas.microsoft.com/office/2006/metadata/contentType" xmlns:ma="http://schemas.microsoft.com/office/2006/metadata/properties/metaAttributes" ct:_="" ma:_="" ma:contentTypeName="Document" ma:contentTypeID="0x01010079F111ED35F8CC479449609E8A0923A6" ma:contentTypeVersion="12" ma:contentTypeDescription="Create a new document." ma:contentTypeScope="" ma:versionID="a410dd7f93c95333ffa1b60ed6adedd1">
   <xsd:schema xmlns:xsd="http://www.w3.org/2001/XMLSchema" xmlns:xs="http://www.w3.org/2001/XMLSchema" xmlns:p="http://schemas.microsoft.com/office/2006/metadata/properties" xmlns:ns2="71af3243-3dd4-4a8d-8c0d-dd76da1f02a5" xmlns:ns3="16c05727-aa75-4e4a-9b5f-8a80a1165891" targetNamespace="http://schemas.microsoft.com/office/2006/metadata/properties" ma:root="true" ma:fieldsID="a936d9baba76aa3866493feff160faab" ns2:_="" ns3:_="">
     <xsd:import namespace="71af3243-3dd4-4a8d-8c0d-dd76da1f02a5"/>
@@ -8928,15 +8937,6 @@
 </ct:contentTypeSchema>
 </file>
 
-<file path=customXml/item3.xml><?xml version="1.0" encoding="utf-8"?>
-<p:properties xmlns:p="http://schemas.microsoft.com/office/2006/metadata/properties" xmlns:xsi="http://www.w3.org/2001/XMLSchema-instance" xmlns:pc="http://schemas.microsoft.com/office/infopath/2007/PartnerControls">
-  <documentManagement>
-    <Status xmlns="71af3243-3dd4-4a8d-8c0d-dd76da1f02a5">Not started</Status>
-    <MediaServiceKeyPoints xmlns="71af3243-3dd4-4a8d-8c0d-dd76da1f02a5" xsi:nil="true"/>
-  </documentManagement>
-</p:properties>
-</file>
-
 <file path=customXml/itemProps1.xml><?xml version="1.0" encoding="utf-8"?>
 <ds:datastoreItem xmlns:ds="http://schemas.openxmlformats.org/officeDocument/2006/customXml" ds:itemID="{CDB58277-F8DF-46FF-84EC-EF41B835E69F}">
   <ds:schemaRefs>
@@ -8946,6 +8946,16 @@
 </file>
 
 <file path=customXml/itemProps2.xml><?xml version="1.0" encoding="utf-8"?>
+<ds:datastoreItem xmlns:ds="http://schemas.openxmlformats.org/officeDocument/2006/customXml" ds:itemID="{137651BA-F45C-4845-9AB3-E0A65B39F5E1}">
+  <ds:schemaRefs>
+    <ds:schemaRef ds:uri="http://schemas.microsoft.com/office/2006/metadata/properties"/>
+    <ds:schemaRef ds:uri="http://schemas.microsoft.com/office/infopath/2007/PartnerControls"/>
+    <ds:schemaRef ds:uri="71af3243-3dd4-4a8d-8c0d-dd76da1f02a5"/>
+  </ds:schemaRefs>
+</ds:datastoreItem>
+</file>
+
+<file path=customXml/itemProps3.xml><?xml version="1.0" encoding="utf-8"?>
 <ds:datastoreItem xmlns:ds="http://schemas.openxmlformats.org/officeDocument/2006/customXml" ds:itemID="{2D276E62-80A3-44DD-9BCC-97ED2B99B57F}">
   <ds:schemaRefs>
     <ds:schemaRef ds:uri="http://schemas.microsoft.com/office/2006/metadata/contentType"/>
@@ -8962,14 +8972,4 @@
     <ds:schemaRef ds:uri="http://schemas.microsoft.com/internal/obd"/>
   </ds:schemaRefs>
 </ds:datastoreItem>
-</file>
-
-<file path=customXml/itemProps3.xml><?xml version="1.0" encoding="utf-8"?>
-<ds:datastoreItem xmlns:ds="http://schemas.openxmlformats.org/officeDocument/2006/customXml" ds:itemID="{137651BA-F45C-4845-9AB3-E0A65B39F5E1}">
-  <ds:schemaRefs>
-    <ds:schemaRef ds:uri="http://schemas.microsoft.com/office/2006/metadata/properties"/>
-    <ds:schemaRef ds:uri="http://schemas.microsoft.com/office/infopath/2007/PartnerControls"/>
-    <ds:schemaRef ds:uri="71af3243-3dd4-4a8d-8c0d-dd76da1f02a5"/>
-  </ds:schemaRefs>
-</ds:datastoreItem>
 </file>
</xml_diff>